<commit_message>
Preparation for migrating move functionality to actor and migrating enemy movement AI to screen class: Refactored Enemy movement tests Added move function to Actor class Removed move method and player instance(& get/set) from enemy class Modified pom.xml to include mockito for Actor class testing Created actor test class
</commit_message>
<xml_diff>
--- a/Redovisningsmall.pptx
+++ b/Redovisningsmall.pptx
@@ -225,7 +225,7 @@
           <a:p>
             <a:fld id="{78657D70-8167-4127-866D-BAA56A2DFFEF}" type="datetimeFigureOut">
               <a:rPr lang="sv-SE" smtClean="0"/>
-              <a:t>2019-10-23</a:t>
+              <a:t>2019-10-26</a:t>
             </a:fld>
             <a:endParaRPr lang="sv-SE"/>
           </a:p>
@@ -3646,7 +3646,7 @@
           <a:p>
             <a:fld id="{B4C653A3-D7FF-4AF7-943B-34A467C3139E}" type="datetimeFigureOut">
               <a:rPr lang="sv-SE" smtClean="0"/>
-              <a:t>2019-10-23</a:t>
+              <a:t>2019-10-26</a:t>
             </a:fld>
             <a:endParaRPr lang="sv-SE"/>
           </a:p>
@@ -3814,7 +3814,7 @@
           <a:p>
             <a:fld id="{B4C653A3-D7FF-4AF7-943B-34A467C3139E}" type="datetimeFigureOut">
               <a:rPr lang="sv-SE" smtClean="0"/>
-              <a:t>2019-10-23</a:t>
+              <a:t>2019-10-26</a:t>
             </a:fld>
             <a:endParaRPr lang="sv-SE"/>
           </a:p>
@@ -3992,7 +3992,7 @@
           <a:p>
             <a:fld id="{B4C653A3-D7FF-4AF7-943B-34A467C3139E}" type="datetimeFigureOut">
               <a:rPr lang="sv-SE" smtClean="0"/>
-              <a:t>2019-10-23</a:t>
+              <a:t>2019-10-26</a:t>
             </a:fld>
             <a:endParaRPr lang="sv-SE"/>
           </a:p>
@@ -4160,7 +4160,7 @@
           <a:p>
             <a:fld id="{B4C653A3-D7FF-4AF7-943B-34A467C3139E}" type="datetimeFigureOut">
               <a:rPr lang="sv-SE" smtClean="0"/>
-              <a:t>2019-10-23</a:t>
+              <a:t>2019-10-26</a:t>
             </a:fld>
             <a:endParaRPr lang="sv-SE"/>
           </a:p>
@@ -4405,7 +4405,7 @@
           <a:p>
             <a:fld id="{B4C653A3-D7FF-4AF7-943B-34A467C3139E}" type="datetimeFigureOut">
               <a:rPr lang="sv-SE" smtClean="0"/>
-              <a:t>2019-10-23</a:t>
+              <a:t>2019-10-26</a:t>
             </a:fld>
             <a:endParaRPr lang="sv-SE"/>
           </a:p>
@@ -4634,7 +4634,7 @@
           <a:p>
             <a:fld id="{B4C653A3-D7FF-4AF7-943B-34A467C3139E}" type="datetimeFigureOut">
               <a:rPr lang="sv-SE" smtClean="0"/>
-              <a:t>2019-10-23</a:t>
+              <a:t>2019-10-26</a:t>
             </a:fld>
             <a:endParaRPr lang="sv-SE"/>
           </a:p>
@@ -4998,7 +4998,7 @@
           <a:p>
             <a:fld id="{B4C653A3-D7FF-4AF7-943B-34A467C3139E}" type="datetimeFigureOut">
               <a:rPr lang="sv-SE" smtClean="0"/>
-              <a:t>2019-10-23</a:t>
+              <a:t>2019-10-26</a:t>
             </a:fld>
             <a:endParaRPr lang="sv-SE"/>
           </a:p>
@@ -5115,7 +5115,7 @@
           <a:p>
             <a:fld id="{B4C653A3-D7FF-4AF7-943B-34A467C3139E}" type="datetimeFigureOut">
               <a:rPr lang="sv-SE" smtClean="0"/>
-              <a:t>2019-10-23</a:t>
+              <a:t>2019-10-26</a:t>
             </a:fld>
             <a:endParaRPr lang="sv-SE"/>
           </a:p>
@@ -5210,7 +5210,7 @@
           <a:p>
             <a:fld id="{B4C653A3-D7FF-4AF7-943B-34A467C3139E}" type="datetimeFigureOut">
               <a:rPr lang="sv-SE" smtClean="0"/>
-              <a:t>2019-10-23</a:t>
+              <a:t>2019-10-26</a:t>
             </a:fld>
             <a:endParaRPr lang="sv-SE"/>
           </a:p>
@@ -5485,7 +5485,7 @@
           <a:p>
             <a:fld id="{B4C653A3-D7FF-4AF7-943B-34A467C3139E}" type="datetimeFigureOut">
               <a:rPr lang="sv-SE" smtClean="0"/>
-              <a:t>2019-10-23</a:t>
+              <a:t>2019-10-26</a:t>
             </a:fld>
             <a:endParaRPr lang="sv-SE"/>
           </a:p>
@@ -5737,7 +5737,7 @@
           <a:p>
             <a:fld id="{B4C653A3-D7FF-4AF7-943B-34A467C3139E}" type="datetimeFigureOut">
               <a:rPr lang="sv-SE" smtClean="0"/>
-              <a:t>2019-10-23</a:t>
+              <a:t>2019-10-26</a:t>
             </a:fld>
             <a:endParaRPr lang="sv-SE"/>
           </a:p>
@@ -5948,7 +5948,7 @@
           <a:p>
             <a:fld id="{B4C653A3-D7FF-4AF7-943B-34A467C3139E}" type="datetimeFigureOut">
               <a:rPr lang="sv-SE" smtClean="0"/>
-              <a:t>2019-10-23</a:t>
+              <a:t>2019-10-26</a:t>
             </a:fld>
             <a:endParaRPr lang="sv-SE"/>
           </a:p>
@@ -6421,7 +6421,7 @@
           <a:p>
             <a:r>
               <a:rPr lang="sv-SE" dirty="0"/>
-              <a:t>Mohammed…</a:t>
+              <a:t>Mohammed – mohammedhussein@protonmail.com</a:t>
             </a:r>
           </a:p>
         </p:txBody>

</xml_diff>